<commit_message>
add calendar default version
</commit_message>
<xml_diff>
--- a/프레젠테이션1 (1).pptx
+++ b/프레젠테이션1 (1).pptx
@@ -258,7 +258,7 @@
           <a:p>
             <a:fld id="{B914021E-FD08-4D36-AE41-0A8AB471C212}" type="datetimeFigureOut">
               <a:rPr lang="ko-KR" altLang="en-US" smtClean="0"/>
-              <a:t>2021-10-03</a:t>
+              <a:t>2021-10-27</a:t>
             </a:fld>
             <a:endParaRPr lang="ko-KR" altLang="en-US"/>
           </a:p>
@@ -426,7 +426,7 @@
           <a:p>
             <a:fld id="{B914021E-FD08-4D36-AE41-0A8AB471C212}" type="datetimeFigureOut">
               <a:rPr lang="ko-KR" altLang="en-US" smtClean="0"/>
-              <a:t>2021-10-03</a:t>
+              <a:t>2021-10-27</a:t>
             </a:fld>
             <a:endParaRPr lang="ko-KR" altLang="en-US"/>
           </a:p>
@@ -604,7 +604,7 @@
           <a:p>
             <a:fld id="{B914021E-FD08-4D36-AE41-0A8AB471C212}" type="datetimeFigureOut">
               <a:rPr lang="ko-KR" altLang="en-US" smtClean="0"/>
-              <a:t>2021-10-03</a:t>
+              <a:t>2021-10-27</a:t>
             </a:fld>
             <a:endParaRPr lang="ko-KR" altLang="en-US"/>
           </a:p>
@@ -772,7 +772,7 @@
           <a:p>
             <a:fld id="{B914021E-FD08-4D36-AE41-0A8AB471C212}" type="datetimeFigureOut">
               <a:rPr lang="ko-KR" altLang="en-US" smtClean="0"/>
-              <a:t>2021-10-03</a:t>
+              <a:t>2021-10-27</a:t>
             </a:fld>
             <a:endParaRPr lang="ko-KR" altLang="en-US"/>
           </a:p>
@@ -1017,7 +1017,7 @@
           <a:p>
             <a:fld id="{B914021E-FD08-4D36-AE41-0A8AB471C212}" type="datetimeFigureOut">
               <a:rPr lang="ko-KR" altLang="en-US" smtClean="0"/>
-              <a:t>2021-10-03</a:t>
+              <a:t>2021-10-27</a:t>
             </a:fld>
             <a:endParaRPr lang="ko-KR" altLang="en-US"/>
           </a:p>
@@ -1246,7 +1246,7 @@
           <a:p>
             <a:fld id="{B914021E-FD08-4D36-AE41-0A8AB471C212}" type="datetimeFigureOut">
               <a:rPr lang="ko-KR" altLang="en-US" smtClean="0"/>
-              <a:t>2021-10-03</a:t>
+              <a:t>2021-10-27</a:t>
             </a:fld>
             <a:endParaRPr lang="ko-KR" altLang="en-US"/>
           </a:p>
@@ -1610,7 +1610,7 @@
           <a:p>
             <a:fld id="{B914021E-FD08-4D36-AE41-0A8AB471C212}" type="datetimeFigureOut">
               <a:rPr lang="ko-KR" altLang="en-US" smtClean="0"/>
-              <a:t>2021-10-03</a:t>
+              <a:t>2021-10-27</a:t>
             </a:fld>
             <a:endParaRPr lang="ko-KR" altLang="en-US"/>
           </a:p>
@@ -1727,7 +1727,7 @@
           <a:p>
             <a:fld id="{B914021E-FD08-4D36-AE41-0A8AB471C212}" type="datetimeFigureOut">
               <a:rPr lang="ko-KR" altLang="en-US" smtClean="0"/>
-              <a:t>2021-10-03</a:t>
+              <a:t>2021-10-27</a:t>
             </a:fld>
             <a:endParaRPr lang="ko-KR" altLang="en-US"/>
           </a:p>
@@ -1822,7 +1822,7 @@
           <a:p>
             <a:fld id="{B914021E-FD08-4D36-AE41-0A8AB471C212}" type="datetimeFigureOut">
               <a:rPr lang="ko-KR" altLang="en-US" smtClean="0"/>
-              <a:t>2021-10-03</a:t>
+              <a:t>2021-10-27</a:t>
             </a:fld>
             <a:endParaRPr lang="ko-KR" altLang="en-US"/>
           </a:p>
@@ -2097,7 +2097,7 @@
           <a:p>
             <a:fld id="{B914021E-FD08-4D36-AE41-0A8AB471C212}" type="datetimeFigureOut">
               <a:rPr lang="ko-KR" altLang="en-US" smtClean="0"/>
-              <a:t>2021-10-03</a:t>
+              <a:t>2021-10-27</a:t>
             </a:fld>
             <a:endParaRPr lang="ko-KR" altLang="en-US"/>
           </a:p>
@@ -2349,7 +2349,7 @@
           <a:p>
             <a:fld id="{B914021E-FD08-4D36-AE41-0A8AB471C212}" type="datetimeFigureOut">
               <a:rPr lang="ko-KR" altLang="en-US" smtClean="0"/>
-              <a:t>2021-10-03</a:t>
+              <a:t>2021-10-27</a:t>
             </a:fld>
             <a:endParaRPr lang="ko-KR" altLang="en-US"/>
           </a:p>
@@ -2560,7 +2560,7 @@
           <a:p>
             <a:fld id="{B914021E-FD08-4D36-AE41-0A8AB471C212}" type="datetimeFigureOut">
               <a:rPr lang="ko-KR" altLang="en-US" smtClean="0"/>
-              <a:t>2021-10-03</a:t>
+              <a:t>2021-10-27</a:t>
             </a:fld>
             <a:endParaRPr lang="ko-KR" altLang="en-US"/>
           </a:p>
@@ -3135,7 +3135,7 @@
         </p:nvSpPr>
         <p:spPr>
           <a:xfrm>
-            <a:off x="4372428" y="547914"/>
+            <a:off x="7944206" y="558332"/>
             <a:ext cx="3447143" cy="515258"/>
           </a:xfrm>
           <a:prstGeom prst="rect">
@@ -3184,39 +3184,6 @@
       </p:sp>
       <p:sp>
         <p:nvSpPr>
-          <p:cNvPr id="12" name="TextBox 11"/>
-          <p:cNvSpPr txBox="1"/>
-          <p:nvPr/>
-        </p:nvSpPr>
-        <p:spPr>
-          <a:xfrm>
-            <a:off x="4459514" y="620877"/>
-            <a:ext cx="1082348" cy="369332"/>
-          </a:xfrm>
-          <a:prstGeom prst="rect">
-            <a:avLst/>
-          </a:prstGeom>
-          <a:noFill/>
-        </p:spPr>
-        <p:txBody>
-          <a:bodyPr wrap="none" rtlCol="0">
-            <a:spAutoFit/>
-          </a:bodyPr>
-          <a:lstStyle/>
-          <a:p>
-            <a:r>
-              <a:rPr lang="ko-KR" altLang="en-US" dirty="0">
-                <a:latin typeface="나눔스퀘어 Bold" panose="020B0600000101010101" pitchFamily="50" charset="-127"/>
-                <a:ea typeface="나눔스퀘어 Bold" panose="020B0600000101010101" pitchFamily="50" charset="-127"/>
-                <a:cs typeface="함초롬바탕" panose="02030604000101010101" pitchFamily="18" charset="-127"/>
-              </a:rPr>
-              <a:t>쉬운 메모</a:t>
-            </a:r>
-          </a:p>
-        </p:txBody>
-      </p:sp>
-      <p:sp>
-        <p:nvSpPr>
           <p:cNvPr id="21" name="직사각형 20">
             <a:extLst>
               <a:ext uri="{FF2B5EF4-FFF2-40B4-BE49-F238E27FC236}">
@@ -3236,15 +3203,73 @@
             <a:avLst/>
           </a:prstGeom>
           <a:solidFill>
-            <a:srgbClr val="CEE4F2"/>
+            <a:schemeClr val="bg1"/>
           </a:solidFill>
-          <a:ln>
+          <a:ln w="3175">
             <a:solidFill>
-              <a:srgbClr val="CEE4F2"/>
+              <a:schemeClr val="tx1">
+                <a:lumMod val="50000"/>
+                <a:lumOff val="50000"/>
+              </a:schemeClr>
+            </a:solidFill>
+          </a:ln>
+          <a:effectLst/>
+        </p:spPr>
+        <p:style>
+          <a:lnRef idx="2">
+            <a:schemeClr val="accent1">
+              <a:shade val="50000"/>
+            </a:schemeClr>
+          </a:lnRef>
+          <a:fillRef idx="1">
+            <a:schemeClr val="accent1"/>
+          </a:fillRef>
+          <a:effectRef idx="0">
+            <a:schemeClr val="accent1"/>
+          </a:effectRef>
+          <a:fontRef idx="minor">
+            <a:schemeClr val="lt1"/>
+          </a:fontRef>
+        </p:style>
+        <p:txBody>
+          <a:bodyPr rtlCol="0" anchor="ctr"/>
+          <a:lstStyle/>
+          <a:p>
+            <a:pPr algn="ctr"/>
+            <a:endParaRPr lang="ko-KR" altLang="en-US"/>
+          </a:p>
+        </p:txBody>
+      </p:sp>
+      <p:sp>
+        <p:nvSpPr>
+          <p:cNvPr id="10" name="직사각형 9">
+            <a:extLst>
+              <a:ext uri="{FF2B5EF4-FFF2-40B4-BE49-F238E27FC236}">
+                <a16:creationId xmlns:a16="http://schemas.microsoft.com/office/drawing/2014/main" id="{BB7CE639-798D-45E8-9ABC-5D80E0E7FE48}"/>
+              </a:ext>
+            </a:extLst>
+          </p:cNvPr>
+          <p:cNvSpPr/>
+          <p:nvPr/>
+        </p:nvSpPr>
+        <p:spPr>
+          <a:xfrm>
+            <a:off x="4382859" y="5794827"/>
+            <a:ext cx="3447143" cy="515258"/>
+          </a:xfrm>
+          <a:prstGeom prst="rect">
+            <a:avLst/>
+          </a:prstGeom>
+          <a:solidFill>
+            <a:srgbClr val="DEDEDE"/>
+          </a:solidFill>
+          <a:ln w="3175">
+            <a:solidFill>
+              <a:srgbClr val="E2F2DA"/>
             </a:solidFill>
           </a:ln>
           <a:effectLst>
-            <a:outerShdw blurRad="50800" dist="38100" dir="2700000" algn="tl" rotWithShape="0">
+            <a:outerShdw blurRad="50800" dist="38100" dir="16200000" rotWithShape="0">
               <a:prstClr val="black">
                 <a:alpha val="13000"/>
               </a:prstClr>
@@ -3276,491 +3301,401 @@
           </a:p>
         </p:txBody>
       </p:sp>
-      <p:grpSp>
-        <p:nvGrpSpPr>
-          <p:cNvPr id="9" name="그룹 8">
+      <p:sp>
+        <p:nvSpPr>
+          <p:cNvPr id="11" name="모서리가 둥근 직사각형 7">
             <a:extLst>
               <a:ext uri="{FF2B5EF4-FFF2-40B4-BE49-F238E27FC236}">
-                <a16:creationId xmlns:a16="http://schemas.microsoft.com/office/drawing/2014/main" id="{04C190BA-611D-43BF-9D2B-F3E37648CED1}"/>
+                <a16:creationId xmlns:a16="http://schemas.microsoft.com/office/drawing/2014/main" id="{4B82F09A-EEB5-49C3-9BEB-15CB357A9BBD}"/>
               </a:ext>
             </a:extLst>
           </p:cNvPr>
-          <p:cNvGrpSpPr/>
+          <p:cNvSpPr/>
           <p:nvPr/>
-        </p:nvGrpSpPr>
-        <p:grpSpPr>
-          <a:xfrm>
-            <a:off x="4372427" y="5794827"/>
-            <a:ext cx="3447143" cy="515258"/>
-            <a:chOff x="8078651" y="5659238"/>
-            <a:chExt cx="3447143" cy="515258"/>
-          </a:xfrm>
-        </p:grpSpPr>
-        <p:sp>
-          <p:nvSpPr>
-            <p:cNvPr id="10" name="직사각형 9">
-              <a:extLst>
-                <a:ext uri="{FF2B5EF4-FFF2-40B4-BE49-F238E27FC236}">
-                  <a16:creationId xmlns:a16="http://schemas.microsoft.com/office/drawing/2014/main" id="{BB7CE639-798D-45E8-9ABC-5D80E0E7FE48}"/>
-                </a:ext>
-              </a:extLst>
-            </p:cNvPr>
-            <p:cNvSpPr/>
-            <p:nvPr/>
-          </p:nvSpPr>
-          <p:spPr>
-            <a:xfrm>
-              <a:off x="8078651" y="5659238"/>
-              <a:ext cx="3447143" cy="515258"/>
-            </a:xfrm>
-            <a:prstGeom prst="rect">
-              <a:avLst/>
-            </a:prstGeom>
+        </p:nvSpPr>
+        <p:spPr>
+          <a:xfrm>
+            <a:off x="4558509" y="5875138"/>
+            <a:ext cx="667657" cy="370114"/>
+          </a:xfrm>
+          <a:prstGeom prst="roundRect">
+            <a:avLst>
+              <a:gd name="adj" fmla="val 28431"/>
+            </a:avLst>
+          </a:prstGeom>
+          <a:noFill/>
+          <a:ln w="3175">
             <a:solidFill>
               <a:srgbClr val="E2F2DA"/>
             </a:solidFill>
-            <a:ln w="3175">
-              <a:solidFill>
-                <a:srgbClr val="E2F2DA"/>
-              </a:solidFill>
-            </a:ln>
-            <a:effectLst>
-              <a:outerShdw blurRad="50800" dist="38100" dir="16200000" rotWithShape="0">
-                <a:prstClr val="black">
-                  <a:alpha val="13000"/>
-                </a:prstClr>
-              </a:outerShdw>
-            </a:effectLst>
-          </p:spPr>
-          <p:style>
-            <a:lnRef idx="2">
-              <a:schemeClr val="accent1">
-                <a:shade val="50000"/>
-              </a:schemeClr>
-            </a:lnRef>
-            <a:fillRef idx="1">
-              <a:schemeClr val="accent1"/>
-            </a:fillRef>
-            <a:effectRef idx="0">
-              <a:schemeClr val="accent1"/>
-            </a:effectRef>
-            <a:fontRef idx="minor">
-              <a:schemeClr val="lt1"/>
-            </a:fontRef>
-          </p:style>
-          <p:txBody>
-            <a:bodyPr rtlCol="0" anchor="ctr"/>
-            <a:lstStyle/>
-            <a:p>
-              <a:pPr algn="ctr"/>
-              <a:endParaRPr lang="ko-KR" altLang="en-US"/>
-            </a:p>
-          </p:txBody>
-        </p:sp>
-        <p:sp>
-          <p:nvSpPr>
-            <p:cNvPr id="11" name="모서리가 둥근 직사각형 7">
-              <a:extLst>
-                <a:ext uri="{FF2B5EF4-FFF2-40B4-BE49-F238E27FC236}">
-                  <a16:creationId xmlns:a16="http://schemas.microsoft.com/office/drawing/2014/main" id="{4B82F09A-EEB5-49C3-9BEB-15CB357A9BBD}"/>
-                </a:ext>
-              </a:extLst>
-            </p:cNvPr>
-            <p:cNvSpPr/>
-            <p:nvPr/>
-          </p:nvSpPr>
-          <p:spPr>
-            <a:xfrm>
-              <a:off x="8264733" y="5739549"/>
-              <a:ext cx="667657" cy="370114"/>
-            </a:xfrm>
-            <a:prstGeom prst="roundRect">
-              <a:avLst>
-                <a:gd name="adj" fmla="val 28431"/>
-              </a:avLst>
-            </a:prstGeom>
+          </a:ln>
+          <a:effectLst/>
+        </p:spPr>
+        <p:style>
+          <a:lnRef idx="2">
+            <a:schemeClr val="accent1">
+              <a:shade val="50000"/>
+            </a:schemeClr>
+          </a:lnRef>
+          <a:fillRef idx="1">
+            <a:schemeClr val="accent1"/>
+          </a:fillRef>
+          <a:effectRef idx="0">
+            <a:schemeClr val="accent1"/>
+          </a:effectRef>
+          <a:fontRef idx="minor">
+            <a:schemeClr val="lt1"/>
+          </a:fontRef>
+        </p:style>
+        <p:txBody>
+          <a:bodyPr rtlCol="0" anchor="ctr"/>
+          <a:lstStyle/>
+          <a:p>
+            <a:pPr algn="ctr"/>
+            <a:r>
+              <a:rPr lang="ko-KR" altLang="en-US" sz="1600" dirty="0">
+                <a:solidFill>
+                  <a:sysClr val="windowText" lastClr="000000"/>
+                </a:solidFill>
+                <a:latin typeface="나눔스퀘어" panose="020B0600000101010101" pitchFamily="50" charset="-127"/>
+                <a:ea typeface="나눔스퀘어" panose="020B0600000101010101" pitchFamily="50" charset="-127"/>
+                <a:cs typeface="함초롬바탕" panose="02030604000101010101" pitchFamily="18" charset="-127"/>
+              </a:rPr>
+              <a:t>메모</a:t>
+            </a:r>
+          </a:p>
+        </p:txBody>
+      </p:sp>
+      <p:sp>
+        <p:nvSpPr>
+          <p:cNvPr id="13" name="모서리가 둥근 직사각형 15">
+            <a:extLst>
+              <a:ext uri="{FF2B5EF4-FFF2-40B4-BE49-F238E27FC236}">
+                <a16:creationId xmlns:a16="http://schemas.microsoft.com/office/drawing/2014/main" id="{30636C90-E61C-485F-8E58-0193A6EF7EE6}"/>
+              </a:ext>
+            </a:extLst>
+          </p:cNvPr>
+          <p:cNvSpPr/>
+          <p:nvPr/>
+        </p:nvSpPr>
+        <p:spPr>
+          <a:xfrm>
+            <a:off x="5360473" y="5867008"/>
+            <a:ext cx="667657" cy="370114"/>
+          </a:xfrm>
+          <a:prstGeom prst="roundRect">
+            <a:avLst>
+              <a:gd name="adj" fmla="val 28431"/>
+            </a:avLst>
+          </a:prstGeom>
+          <a:noFill/>
+          <a:ln w="3175">
             <a:solidFill>
               <a:srgbClr val="E2F2DA"/>
             </a:solidFill>
-            <a:ln w="3175">
-              <a:solidFill>
-                <a:srgbClr val="E2F2DA"/>
-              </a:solidFill>
-            </a:ln>
-            <a:effectLst/>
-          </p:spPr>
-          <p:style>
-            <a:lnRef idx="2">
-              <a:schemeClr val="accent1">
-                <a:shade val="50000"/>
-              </a:schemeClr>
-            </a:lnRef>
-            <a:fillRef idx="1">
-              <a:schemeClr val="accent1"/>
-            </a:fillRef>
-            <a:effectRef idx="0">
-              <a:schemeClr val="accent1"/>
-            </a:effectRef>
-            <a:fontRef idx="minor">
-              <a:schemeClr val="lt1"/>
-            </a:fontRef>
-          </p:style>
-          <p:txBody>
-            <a:bodyPr rtlCol="0" anchor="ctr"/>
-            <a:lstStyle/>
-            <a:p>
-              <a:pPr algn="ctr"/>
-              <a:r>
-                <a:rPr lang="ko-KR" altLang="en-US" sz="1600" dirty="0">
-                  <a:solidFill>
-                    <a:sysClr val="windowText" lastClr="000000"/>
-                  </a:solidFill>
-                  <a:latin typeface="나눔스퀘어" panose="020B0600000101010101" pitchFamily="50" charset="-127"/>
-                  <a:ea typeface="나눔스퀘어" panose="020B0600000101010101" pitchFamily="50" charset="-127"/>
-                  <a:cs typeface="함초롬바탕" panose="02030604000101010101" pitchFamily="18" charset="-127"/>
-                </a:rPr>
-                <a:t>메모</a:t>
-              </a:r>
-            </a:p>
-          </p:txBody>
-        </p:sp>
-        <p:sp>
-          <p:nvSpPr>
-            <p:cNvPr id="13" name="모서리가 둥근 직사각형 15">
-              <a:extLst>
-                <a:ext uri="{FF2B5EF4-FFF2-40B4-BE49-F238E27FC236}">
-                  <a16:creationId xmlns:a16="http://schemas.microsoft.com/office/drawing/2014/main" id="{30636C90-E61C-485F-8E58-0193A6EF7EE6}"/>
-                </a:ext>
-              </a:extLst>
-            </p:cNvPr>
-            <p:cNvSpPr/>
-            <p:nvPr/>
-          </p:nvSpPr>
-          <p:spPr>
-            <a:xfrm>
-              <a:off x="9066697" y="5731419"/>
-              <a:ext cx="667657" cy="370114"/>
-            </a:xfrm>
-            <a:prstGeom prst="roundRect">
-              <a:avLst>
-                <a:gd name="adj" fmla="val 28431"/>
-              </a:avLst>
-            </a:prstGeom>
+          </a:ln>
+          <a:effectLst/>
+        </p:spPr>
+        <p:style>
+          <a:lnRef idx="2">
+            <a:schemeClr val="accent1">
+              <a:shade val="50000"/>
+            </a:schemeClr>
+          </a:lnRef>
+          <a:fillRef idx="1">
+            <a:schemeClr val="accent1"/>
+          </a:fillRef>
+          <a:effectRef idx="0">
+            <a:schemeClr val="accent1"/>
+          </a:effectRef>
+          <a:fontRef idx="minor">
+            <a:schemeClr val="lt1"/>
+          </a:fontRef>
+        </p:style>
+        <p:txBody>
+          <a:bodyPr rtlCol="0" anchor="ctr"/>
+          <a:lstStyle/>
+          <a:p>
+            <a:pPr lvl="0" algn="ctr"/>
+            <a:r>
+              <a:rPr lang="ko-KR" altLang="en-US" sz="1600" dirty="0">
+                <a:solidFill>
+                  <a:sysClr val="windowText" lastClr="000000"/>
+                </a:solidFill>
+                <a:latin typeface="나눔스퀘어" panose="020B0600000101010101" pitchFamily="50" charset="-127"/>
+                <a:ea typeface="나눔스퀘어" panose="020B0600000101010101" pitchFamily="50" charset="-127"/>
+                <a:cs typeface="함초롬바탕" panose="02030604000101010101" pitchFamily="18" charset="-127"/>
+              </a:rPr>
+              <a:t>달력</a:t>
+            </a:r>
+          </a:p>
+        </p:txBody>
+      </p:sp>
+      <p:sp>
+        <p:nvSpPr>
+          <p:cNvPr id="14" name="모서리가 둥근 직사각형 16">
+            <a:extLst>
+              <a:ext uri="{FF2B5EF4-FFF2-40B4-BE49-F238E27FC236}">
+                <a16:creationId xmlns:a16="http://schemas.microsoft.com/office/drawing/2014/main" id="{AE8F6378-849A-4196-B80C-B1B6B4D3AC64}"/>
+              </a:ext>
+            </a:extLst>
+          </p:cNvPr>
+          <p:cNvSpPr/>
+          <p:nvPr/>
+        </p:nvSpPr>
+        <p:spPr>
+          <a:xfrm>
+            <a:off x="6149580" y="5875138"/>
+            <a:ext cx="667657" cy="370114"/>
+          </a:xfrm>
+          <a:prstGeom prst="roundRect">
+            <a:avLst>
+              <a:gd name="adj" fmla="val 28431"/>
+            </a:avLst>
+          </a:prstGeom>
+          <a:noFill/>
+          <a:ln w="3175">
             <a:solidFill>
               <a:srgbClr val="E2F2DA"/>
             </a:solidFill>
-            <a:ln w="3175">
-              <a:solidFill>
-                <a:srgbClr val="E2F2DA"/>
-              </a:solidFill>
-            </a:ln>
-            <a:effectLst/>
-          </p:spPr>
-          <p:style>
-            <a:lnRef idx="2">
-              <a:schemeClr val="accent1">
-                <a:shade val="50000"/>
-              </a:schemeClr>
-            </a:lnRef>
-            <a:fillRef idx="1">
-              <a:schemeClr val="accent1"/>
-            </a:fillRef>
-            <a:effectRef idx="0">
-              <a:schemeClr val="accent1"/>
-            </a:effectRef>
-            <a:fontRef idx="minor">
-              <a:schemeClr val="lt1"/>
-            </a:fontRef>
-          </p:style>
-          <p:txBody>
-            <a:bodyPr rtlCol="0" anchor="ctr"/>
-            <a:lstStyle/>
-            <a:p>
-              <a:pPr lvl="0" algn="ctr"/>
-              <a:r>
-                <a:rPr lang="ko-KR" altLang="en-US" sz="1600" dirty="0">
-                  <a:solidFill>
-                    <a:sysClr val="windowText" lastClr="000000"/>
-                  </a:solidFill>
-                  <a:latin typeface="나눔스퀘어" panose="020B0600000101010101" pitchFamily="50" charset="-127"/>
-                  <a:ea typeface="나눔스퀘어" panose="020B0600000101010101" pitchFamily="50" charset="-127"/>
-                  <a:cs typeface="함초롬바탕" panose="02030604000101010101" pitchFamily="18" charset="-127"/>
-                </a:rPr>
-                <a:t>달력</a:t>
-              </a:r>
-            </a:p>
-          </p:txBody>
-        </p:sp>
-        <p:sp>
-          <p:nvSpPr>
-            <p:cNvPr id="14" name="모서리가 둥근 직사각형 16">
-              <a:extLst>
-                <a:ext uri="{FF2B5EF4-FFF2-40B4-BE49-F238E27FC236}">
-                  <a16:creationId xmlns:a16="http://schemas.microsoft.com/office/drawing/2014/main" id="{AE8F6378-849A-4196-B80C-B1B6B4D3AC64}"/>
-                </a:ext>
-              </a:extLst>
-            </p:cNvPr>
-            <p:cNvSpPr/>
-            <p:nvPr/>
-          </p:nvSpPr>
-          <p:spPr>
-            <a:xfrm>
-              <a:off x="9855804" y="5739549"/>
-              <a:ext cx="667657" cy="370114"/>
-            </a:xfrm>
-            <a:prstGeom prst="roundRect">
-              <a:avLst>
-                <a:gd name="adj" fmla="val 28431"/>
-              </a:avLst>
-            </a:prstGeom>
+          </a:ln>
+          <a:effectLst/>
+        </p:spPr>
+        <p:style>
+          <a:lnRef idx="2">
+            <a:schemeClr val="accent1">
+              <a:shade val="50000"/>
+            </a:schemeClr>
+          </a:lnRef>
+          <a:fillRef idx="1">
+            <a:schemeClr val="accent1"/>
+          </a:fillRef>
+          <a:effectRef idx="0">
+            <a:schemeClr val="accent1"/>
+          </a:effectRef>
+          <a:fontRef idx="minor">
+            <a:schemeClr val="lt1"/>
+          </a:fontRef>
+        </p:style>
+        <p:txBody>
+          <a:bodyPr rtlCol="0" anchor="ctr"/>
+          <a:lstStyle/>
+          <a:p>
+            <a:pPr lvl="0" algn="ctr"/>
+            <a:r>
+              <a:rPr lang="ko-KR" altLang="en-US" sz="1600" dirty="0">
+                <a:solidFill>
+                  <a:sysClr val="windowText" lastClr="000000"/>
+                </a:solidFill>
+                <a:latin typeface="나눔스퀘어" panose="020B0600000101010101" pitchFamily="50" charset="-127"/>
+                <a:ea typeface="나눔스퀘어" panose="020B0600000101010101" pitchFamily="50" charset="-127"/>
+                <a:cs typeface="함초롬바탕" panose="02030604000101010101" pitchFamily="18" charset="-127"/>
+              </a:rPr>
+              <a:t>검색</a:t>
+            </a:r>
+          </a:p>
+        </p:txBody>
+      </p:sp>
+      <p:sp>
+        <p:nvSpPr>
+          <p:cNvPr id="15" name="모서리가 둥근 직사각형 17">
+            <a:extLst>
+              <a:ext uri="{FF2B5EF4-FFF2-40B4-BE49-F238E27FC236}">
+                <a16:creationId xmlns:a16="http://schemas.microsoft.com/office/drawing/2014/main" id="{2775D6E3-919A-465E-916E-DB64BF8A1AD3}"/>
+              </a:ext>
+            </a:extLst>
+          </p:cNvPr>
+          <p:cNvSpPr/>
+          <p:nvPr/>
+        </p:nvSpPr>
+        <p:spPr>
+          <a:xfrm>
+            <a:off x="7031740" y="5867008"/>
+            <a:ext cx="667657" cy="370114"/>
+          </a:xfrm>
+          <a:prstGeom prst="roundRect">
+            <a:avLst>
+              <a:gd name="adj" fmla="val 28431"/>
+            </a:avLst>
+          </a:prstGeom>
+          <a:noFill/>
+          <a:ln w="3175">
             <a:solidFill>
               <a:srgbClr val="E2F2DA"/>
             </a:solidFill>
-            <a:ln w="3175">
-              <a:solidFill>
-                <a:srgbClr val="E2F2DA"/>
-              </a:solidFill>
-            </a:ln>
-            <a:effectLst/>
-          </p:spPr>
-          <p:style>
-            <a:lnRef idx="2">
-              <a:schemeClr val="accent1">
-                <a:shade val="50000"/>
+          </a:ln>
+          <a:effectLst/>
+        </p:spPr>
+        <p:style>
+          <a:lnRef idx="2">
+            <a:schemeClr val="accent1">
+              <a:shade val="50000"/>
+            </a:schemeClr>
+          </a:lnRef>
+          <a:fillRef idx="1">
+            <a:schemeClr val="accent1"/>
+          </a:fillRef>
+          <a:effectRef idx="0">
+            <a:schemeClr val="accent1"/>
+          </a:effectRef>
+          <a:fontRef idx="minor">
+            <a:schemeClr val="lt1"/>
+          </a:fontRef>
+        </p:style>
+        <p:txBody>
+          <a:bodyPr rtlCol="0" anchor="ctr"/>
+          <a:lstStyle/>
+          <a:p>
+            <a:pPr lvl="0" algn="ctr"/>
+            <a:r>
+              <a:rPr lang="ko-KR" altLang="en-US" sz="1600" dirty="0">
+                <a:solidFill>
+                  <a:sysClr val="windowText" lastClr="000000"/>
+                </a:solidFill>
+                <a:latin typeface="나눔스퀘어" panose="020B0600000101010101" pitchFamily="50" charset="-127"/>
+                <a:ea typeface="나눔스퀘어" panose="020B0600000101010101" pitchFamily="50" charset="-127"/>
+                <a:cs typeface="함초롬바탕" panose="02030604000101010101" pitchFamily="18" charset="-127"/>
+              </a:rPr>
+              <a:t>설정</a:t>
+            </a:r>
+          </a:p>
+        </p:txBody>
+      </p:sp>
+      <p:cxnSp>
+        <p:nvCxnSpPr>
+          <p:cNvPr id="3" name="직선 연결선 2">
+            <a:extLst>
+              <a:ext uri="{FF2B5EF4-FFF2-40B4-BE49-F238E27FC236}">
+                <a16:creationId xmlns:a16="http://schemas.microsoft.com/office/drawing/2014/main" id="{A7210194-B2C0-4998-AD2E-8BB52B1E1BCE}"/>
+              </a:ext>
+            </a:extLst>
+          </p:cNvPr>
+          <p:cNvCxnSpPr>
+            <a:cxnSpLocks/>
+          </p:cNvCxnSpPr>
+          <p:nvPr/>
+        </p:nvCxnSpPr>
+        <p:spPr>
+          <a:xfrm>
+            <a:off x="5266507" y="5832563"/>
+            <a:ext cx="0" cy="442686"/>
+          </a:xfrm>
+          <a:prstGeom prst="line">
+            <a:avLst/>
+          </a:prstGeom>
+          <a:ln>
+            <a:solidFill>
+              <a:schemeClr val="bg1">
+                <a:lumMod val="65000"/>
               </a:schemeClr>
-            </a:lnRef>
-            <a:fillRef idx="1">
-              <a:schemeClr val="accent1"/>
-            </a:fillRef>
-            <a:effectRef idx="0">
-              <a:schemeClr val="accent1"/>
-            </a:effectRef>
-            <a:fontRef idx="minor">
-              <a:schemeClr val="lt1"/>
-            </a:fontRef>
-          </p:style>
-          <p:txBody>
-            <a:bodyPr rtlCol="0" anchor="ctr"/>
-            <a:lstStyle/>
-            <a:p>
-              <a:pPr lvl="0" algn="ctr"/>
-              <a:r>
-                <a:rPr lang="ko-KR" altLang="en-US" sz="1600" dirty="0">
-                  <a:solidFill>
-                    <a:sysClr val="windowText" lastClr="000000"/>
-                  </a:solidFill>
-                  <a:latin typeface="나눔스퀘어" panose="020B0600000101010101" pitchFamily="50" charset="-127"/>
-                  <a:ea typeface="나눔스퀘어" panose="020B0600000101010101" pitchFamily="50" charset="-127"/>
-                  <a:cs typeface="함초롬바탕" panose="02030604000101010101" pitchFamily="18" charset="-127"/>
-                </a:rPr>
-                <a:t>검색</a:t>
-              </a:r>
-            </a:p>
-          </p:txBody>
-        </p:sp>
-        <p:sp>
-          <p:nvSpPr>
-            <p:cNvPr id="15" name="모서리가 둥근 직사각형 17">
-              <a:extLst>
-                <a:ext uri="{FF2B5EF4-FFF2-40B4-BE49-F238E27FC236}">
-                  <a16:creationId xmlns:a16="http://schemas.microsoft.com/office/drawing/2014/main" id="{2775D6E3-919A-465E-916E-DB64BF8A1AD3}"/>
-                </a:ext>
-              </a:extLst>
-            </p:cNvPr>
-            <p:cNvSpPr/>
-            <p:nvPr/>
-          </p:nvSpPr>
-          <p:spPr>
-            <a:xfrm>
-              <a:off x="10698471" y="5739549"/>
-              <a:ext cx="667657" cy="370114"/>
-            </a:xfrm>
-            <a:prstGeom prst="roundRect">
-              <a:avLst>
-                <a:gd name="adj" fmla="val 28431"/>
-              </a:avLst>
-            </a:prstGeom>
+            </a:solidFill>
+          </a:ln>
+        </p:spPr>
+        <p:style>
+          <a:lnRef idx="1">
+            <a:schemeClr val="accent1"/>
+          </a:lnRef>
+          <a:fillRef idx="0">
+            <a:schemeClr val="accent1"/>
+          </a:fillRef>
+          <a:effectRef idx="0">
+            <a:schemeClr val="accent1"/>
+          </a:effectRef>
+          <a:fontRef idx="minor">
+            <a:schemeClr val="tx1"/>
+          </a:fontRef>
+        </p:style>
+      </p:cxnSp>
+      <p:cxnSp>
+        <p:nvCxnSpPr>
+          <p:cNvPr id="19" name="직선 연결선 18">
+            <a:extLst>
+              <a:ext uri="{FF2B5EF4-FFF2-40B4-BE49-F238E27FC236}">
+                <a16:creationId xmlns:a16="http://schemas.microsoft.com/office/drawing/2014/main" id="{04AF0924-0016-432E-9953-6A60FEA65A55}"/>
+              </a:ext>
+            </a:extLst>
+          </p:cNvPr>
+          <p:cNvCxnSpPr>
+            <a:cxnSpLocks/>
+          </p:cNvCxnSpPr>
+          <p:nvPr/>
+        </p:nvCxnSpPr>
+        <p:spPr>
+          <a:xfrm>
+            <a:off x="6055615" y="5832563"/>
+            <a:ext cx="0" cy="442686"/>
+          </a:xfrm>
+          <a:prstGeom prst="line">
+            <a:avLst/>
+          </a:prstGeom>
+          <a:ln>
             <a:solidFill>
-              <a:srgbClr val="E2F2DA"/>
+              <a:schemeClr val="bg1">
+                <a:lumMod val="65000"/>
+              </a:schemeClr>
             </a:solidFill>
-            <a:ln w="3175">
-              <a:solidFill>
-                <a:srgbClr val="E2F2DA"/>
-              </a:solidFill>
-            </a:ln>
-            <a:effectLst/>
-          </p:spPr>
-          <p:style>
-            <a:lnRef idx="2">
-              <a:schemeClr val="accent1">
-                <a:shade val="50000"/>
+          </a:ln>
+        </p:spPr>
+        <p:style>
+          <a:lnRef idx="1">
+            <a:schemeClr val="accent1"/>
+          </a:lnRef>
+          <a:fillRef idx="0">
+            <a:schemeClr val="accent1"/>
+          </a:fillRef>
+          <a:effectRef idx="0">
+            <a:schemeClr val="accent1"/>
+          </a:effectRef>
+          <a:fontRef idx="minor">
+            <a:schemeClr val="tx1"/>
+          </a:fontRef>
+        </p:style>
+      </p:cxnSp>
+      <p:cxnSp>
+        <p:nvCxnSpPr>
+          <p:cNvPr id="20" name="직선 연결선 19">
+            <a:extLst>
+              <a:ext uri="{FF2B5EF4-FFF2-40B4-BE49-F238E27FC236}">
+                <a16:creationId xmlns:a16="http://schemas.microsoft.com/office/drawing/2014/main" id="{574E4767-BBDC-4969-A4DF-F082A63A68FF}"/>
+              </a:ext>
+            </a:extLst>
+          </p:cNvPr>
+          <p:cNvCxnSpPr>
+            <a:cxnSpLocks/>
+          </p:cNvCxnSpPr>
+          <p:nvPr/>
+        </p:nvCxnSpPr>
+        <p:spPr>
+          <a:xfrm>
+            <a:off x="6911565" y="5832563"/>
+            <a:ext cx="0" cy="442686"/>
+          </a:xfrm>
+          <a:prstGeom prst="line">
+            <a:avLst/>
+          </a:prstGeom>
+          <a:ln>
+            <a:solidFill>
+              <a:schemeClr val="bg1">
+                <a:lumMod val="65000"/>
               </a:schemeClr>
-            </a:lnRef>
-            <a:fillRef idx="1">
-              <a:schemeClr val="accent1"/>
-            </a:fillRef>
-            <a:effectRef idx="0">
-              <a:schemeClr val="accent1"/>
-            </a:effectRef>
-            <a:fontRef idx="minor">
-              <a:schemeClr val="lt1"/>
-            </a:fontRef>
-          </p:style>
-          <p:txBody>
-            <a:bodyPr rtlCol="0" anchor="ctr"/>
-            <a:lstStyle/>
-            <a:p>
-              <a:pPr lvl="0" algn="ctr"/>
-              <a:r>
-                <a:rPr lang="ko-KR" altLang="en-US" sz="1600" dirty="0">
-                  <a:solidFill>
-                    <a:sysClr val="windowText" lastClr="000000"/>
-                  </a:solidFill>
-                  <a:latin typeface="나눔스퀘어" panose="020B0600000101010101" pitchFamily="50" charset="-127"/>
-                  <a:ea typeface="나눔스퀘어" panose="020B0600000101010101" pitchFamily="50" charset="-127"/>
-                  <a:cs typeface="함초롬바탕" panose="02030604000101010101" pitchFamily="18" charset="-127"/>
-                </a:rPr>
-                <a:t>설정</a:t>
-              </a:r>
-            </a:p>
-          </p:txBody>
-        </p:sp>
-        <p:cxnSp>
-          <p:nvCxnSpPr>
-            <p:cNvPr id="3" name="직선 연결선 2">
-              <a:extLst>
-                <a:ext uri="{FF2B5EF4-FFF2-40B4-BE49-F238E27FC236}">
-                  <a16:creationId xmlns:a16="http://schemas.microsoft.com/office/drawing/2014/main" id="{A7210194-B2C0-4998-AD2E-8BB52B1E1BCE}"/>
-                </a:ext>
-              </a:extLst>
-            </p:cNvPr>
-            <p:cNvCxnSpPr>
-              <a:cxnSpLocks/>
-            </p:cNvCxnSpPr>
-            <p:nvPr/>
-          </p:nvCxnSpPr>
-          <p:spPr>
-            <a:xfrm>
-              <a:off x="8972731" y="5696974"/>
-              <a:ext cx="0" cy="442686"/>
-            </a:xfrm>
-            <a:prstGeom prst="line">
-              <a:avLst/>
-            </a:prstGeom>
-            <a:ln>
-              <a:solidFill>
-                <a:schemeClr val="bg1">
-                  <a:lumMod val="65000"/>
-                </a:schemeClr>
-              </a:solidFill>
-            </a:ln>
-          </p:spPr>
-          <p:style>
-            <a:lnRef idx="1">
-              <a:schemeClr val="accent1"/>
-            </a:lnRef>
-            <a:fillRef idx="0">
-              <a:schemeClr val="accent1"/>
-            </a:fillRef>
-            <a:effectRef idx="0">
-              <a:schemeClr val="accent1"/>
-            </a:effectRef>
-            <a:fontRef idx="minor">
-              <a:schemeClr val="tx1"/>
-            </a:fontRef>
-          </p:style>
-        </p:cxnSp>
-        <p:cxnSp>
-          <p:nvCxnSpPr>
-            <p:cNvPr id="19" name="직선 연결선 18">
-              <a:extLst>
-                <a:ext uri="{FF2B5EF4-FFF2-40B4-BE49-F238E27FC236}">
-                  <a16:creationId xmlns:a16="http://schemas.microsoft.com/office/drawing/2014/main" id="{04AF0924-0016-432E-9953-6A60FEA65A55}"/>
-                </a:ext>
-              </a:extLst>
-            </p:cNvPr>
-            <p:cNvCxnSpPr>
-              <a:cxnSpLocks/>
-            </p:cNvCxnSpPr>
-            <p:nvPr/>
-          </p:nvCxnSpPr>
-          <p:spPr>
-            <a:xfrm>
-              <a:off x="9761839" y="5696974"/>
-              <a:ext cx="0" cy="442686"/>
-            </a:xfrm>
-            <a:prstGeom prst="line">
-              <a:avLst/>
-            </a:prstGeom>
-            <a:ln>
-              <a:solidFill>
-                <a:schemeClr val="bg1">
-                  <a:lumMod val="65000"/>
-                </a:schemeClr>
-              </a:solidFill>
-            </a:ln>
-          </p:spPr>
-          <p:style>
-            <a:lnRef idx="1">
-              <a:schemeClr val="accent1"/>
-            </a:lnRef>
-            <a:fillRef idx="0">
-              <a:schemeClr val="accent1"/>
-            </a:fillRef>
-            <a:effectRef idx="0">
-              <a:schemeClr val="accent1"/>
-            </a:effectRef>
-            <a:fontRef idx="minor">
-              <a:schemeClr val="tx1"/>
-            </a:fontRef>
-          </p:style>
-        </p:cxnSp>
-        <p:cxnSp>
-          <p:nvCxnSpPr>
-            <p:cNvPr id="20" name="직선 연결선 19">
-              <a:extLst>
-                <a:ext uri="{FF2B5EF4-FFF2-40B4-BE49-F238E27FC236}">
-                  <a16:creationId xmlns:a16="http://schemas.microsoft.com/office/drawing/2014/main" id="{574E4767-BBDC-4969-A4DF-F082A63A68FF}"/>
-                </a:ext>
-              </a:extLst>
-            </p:cNvPr>
-            <p:cNvCxnSpPr>
-              <a:cxnSpLocks/>
-            </p:cNvCxnSpPr>
-            <p:nvPr/>
-          </p:nvCxnSpPr>
-          <p:spPr>
-            <a:xfrm>
-              <a:off x="10617789" y="5696974"/>
-              <a:ext cx="0" cy="442686"/>
-            </a:xfrm>
-            <a:prstGeom prst="line">
-              <a:avLst/>
-            </a:prstGeom>
-            <a:ln>
-              <a:solidFill>
-                <a:schemeClr val="bg1">
-                  <a:lumMod val="65000"/>
-                </a:schemeClr>
-              </a:solidFill>
-            </a:ln>
-          </p:spPr>
-          <p:style>
-            <a:lnRef idx="1">
-              <a:schemeClr val="accent1"/>
-            </a:lnRef>
-            <a:fillRef idx="0">
-              <a:schemeClr val="accent1"/>
-            </a:fillRef>
-            <a:effectRef idx="0">
-              <a:schemeClr val="accent1"/>
-            </a:effectRef>
-            <a:fontRef idx="minor">
-              <a:schemeClr val="tx1"/>
-            </a:fontRef>
-          </p:style>
-        </p:cxnSp>
-      </p:grpSp>
+            </a:solidFill>
+          </a:ln>
+        </p:spPr>
+        <p:style>
+          <a:lnRef idx="1">
+            <a:schemeClr val="accent1"/>
+          </a:lnRef>
+          <a:fillRef idx="0">
+            <a:schemeClr val="accent1"/>
+          </a:fillRef>
+          <a:effectRef idx="0">
+            <a:schemeClr val="accent1"/>
+          </a:effectRef>
+          <a:fontRef idx="minor">
+            <a:schemeClr val="tx1"/>
+          </a:fontRef>
+        </p:style>
+      </p:cxnSp>
       <p:sp>
         <p:nvSpPr>
           <p:cNvPr id="22" name="TextBox 21">
@@ -3912,6 +3847,15 @@
           <a:prstGeom prst="rect">
             <a:avLst/>
           </a:prstGeom>
+          <a:solidFill>
+            <a:schemeClr val="accent1">
+              <a:lumMod val="20000"/>
+              <a:lumOff val="80000"/>
+            </a:schemeClr>
+          </a:solidFill>
+          <a:ln>
+            <a:noFill/>
+          </a:ln>
         </p:spPr>
         <p:style>
           <a:lnRef idx="2">
@@ -3933,8 +3877,221 @@
           <a:bodyPr rtlCol="0" anchor="ctr"/>
           <a:lstStyle/>
           <a:p>
+            <a:r>
+              <a:rPr lang="en-US" altLang="ko-KR" dirty="0">
+                <a:solidFill>
+                  <a:schemeClr val="tx1"/>
+                </a:solidFill>
+                <a:ea typeface="나눔스퀘어" panose="020B0600000101010101"/>
+              </a:rPr>
+              <a:t>ABC</a:t>
+            </a:r>
+          </a:p>
+          <a:p>
+            <a:r>
+              <a:rPr lang="en-US" altLang="ko-KR" sz="1400" dirty="0" err="1">
+                <a:solidFill>
+                  <a:schemeClr val="tx1"/>
+                </a:solidFill>
+                <a:ea typeface="나눔스퀘어" panose="020B0600000101010101"/>
+              </a:rPr>
+              <a:t>abc</a:t>
+            </a:r>
+            <a:r>
+              <a:rPr lang="en-US" altLang="ko-KR" sz="1400" dirty="0">
+                <a:solidFill>
+                  <a:schemeClr val="tx1"/>
+                </a:solidFill>
+                <a:ea typeface="나눔스퀘어" panose="020B0600000101010101"/>
+              </a:rPr>
+              <a:t>…</a:t>
+            </a:r>
+            <a:endParaRPr lang="ko-KR" altLang="en-US" sz="1400" dirty="0">
+              <a:solidFill>
+                <a:schemeClr val="tx1"/>
+              </a:solidFill>
+              <a:ea typeface="나눔스퀘어" panose="020B0600000101010101"/>
+            </a:endParaRPr>
+          </a:p>
+        </p:txBody>
+      </p:sp>
+      <p:sp>
+        <p:nvSpPr>
+          <p:cNvPr id="24" name="직사각형 23">
+            <a:extLst>
+              <a:ext uri="{FF2B5EF4-FFF2-40B4-BE49-F238E27FC236}">
+                <a16:creationId xmlns:a16="http://schemas.microsoft.com/office/drawing/2014/main" id="{B64514DB-06F2-40C9-82D8-9E58F78CF321}"/>
+              </a:ext>
+            </a:extLst>
+          </p:cNvPr>
+          <p:cNvSpPr/>
+          <p:nvPr/>
+        </p:nvSpPr>
+        <p:spPr>
+          <a:xfrm>
+            <a:off x="4361997" y="563207"/>
+            <a:ext cx="3447143" cy="515258"/>
+          </a:xfrm>
+          <a:prstGeom prst="rect">
+            <a:avLst/>
+          </a:prstGeom>
+          <a:solidFill>
+            <a:srgbClr val="DEDEDE"/>
+          </a:solidFill>
+          <a:ln w="3175">
+            <a:solidFill>
+              <a:srgbClr val="E2F2DA"/>
+            </a:solidFill>
+          </a:ln>
+          <a:effectLst>
+            <a:outerShdw blurRad="50800" dist="38100" dir="16200000" rotWithShape="0">
+              <a:prstClr val="black">
+                <a:alpha val="13000"/>
+              </a:prstClr>
+            </a:outerShdw>
+          </a:effectLst>
+        </p:spPr>
+        <p:style>
+          <a:lnRef idx="2">
+            <a:schemeClr val="accent1">
+              <a:shade val="50000"/>
+            </a:schemeClr>
+          </a:lnRef>
+          <a:fillRef idx="1">
+            <a:schemeClr val="accent1"/>
+          </a:fillRef>
+          <a:effectRef idx="0">
+            <a:schemeClr val="accent1"/>
+          </a:effectRef>
+          <a:fontRef idx="minor">
+            <a:schemeClr val="lt1"/>
+          </a:fontRef>
+        </p:style>
+        <p:txBody>
+          <a:bodyPr rtlCol="0" anchor="ctr"/>
+          <a:lstStyle/>
+          <a:p>
             <a:pPr algn="ctr"/>
             <a:endParaRPr lang="ko-KR" altLang="en-US"/>
+          </a:p>
+        </p:txBody>
+      </p:sp>
+      <p:cxnSp>
+        <p:nvCxnSpPr>
+          <p:cNvPr id="5" name="직선 연결선 4">
+            <a:extLst>
+              <a:ext uri="{FF2B5EF4-FFF2-40B4-BE49-F238E27FC236}">
+                <a16:creationId xmlns:a16="http://schemas.microsoft.com/office/drawing/2014/main" id="{5419AEE0-ADF1-4FA0-B921-49638F66EED7}"/>
+              </a:ext>
+            </a:extLst>
+          </p:cNvPr>
+          <p:cNvCxnSpPr>
+            <a:cxnSpLocks/>
+          </p:cNvCxnSpPr>
+          <p:nvPr/>
+        </p:nvCxnSpPr>
+        <p:spPr>
+          <a:xfrm>
+            <a:off x="240304" y="3710011"/>
+            <a:ext cx="3191058" cy="57687"/>
+          </a:xfrm>
+          <a:prstGeom prst="line">
+            <a:avLst/>
+          </a:prstGeom>
+        </p:spPr>
+        <p:style>
+          <a:lnRef idx="1">
+            <a:schemeClr val="dk1"/>
+          </a:lnRef>
+          <a:fillRef idx="0">
+            <a:schemeClr val="dk1"/>
+          </a:fillRef>
+          <a:effectRef idx="0">
+            <a:schemeClr val="dk1"/>
+          </a:effectRef>
+          <a:fontRef idx="minor">
+            <a:schemeClr val="tx1"/>
+          </a:fontRef>
+        </p:style>
+      </p:cxnSp>
+      <p:sp>
+        <p:nvSpPr>
+          <p:cNvPr id="12" name="TextBox 11"/>
+          <p:cNvSpPr txBox="1"/>
+          <p:nvPr/>
+        </p:nvSpPr>
+        <p:spPr>
+          <a:xfrm>
+            <a:off x="4459514" y="620877"/>
+            <a:ext cx="1082348" cy="369332"/>
+          </a:xfrm>
+          <a:prstGeom prst="rect">
+            <a:avLst/>
+          </a:prstGeom>
+          <a:noFill/>
+        </p:spPr>
+        <p:txBody>
+          <a:bodyPr wrap="none" rtlCol="0">
+            <a:spAutoFit/>
+          </a:bodyPr>
+          <a:lstStyle/>
+          <a:p>
+            <a:r>
+              <a:rPr lang="ko-KR" altLang="en-US" dirty="0">
+                <a:latin typeface="나눔스퀘어 Bold" panose="020B0600000101010101" pitchFamily="50" charset="-127"/>
+                <a:ea typeface="나눔스퀘어 Bold" panose="020B0600000101010101" pitchFamily="50" charset="-127"/>
+                <a:cs typeface="함초롬바탕" panose="02030604000101010101" pitchFamily="18" charset="-127"/>
+              </a:rPr>
+              <a:t>쉬운 메모</a:t>
+            </a:r>
+          </a:p>
+        </p:txBody>
+      </p:sp>
+      <p:sp>
+        <p:nvSpPr>
+          <p:cNvPr id="8" name="TextBox 7">
+            <a:extLst>
+              <a:ext uri="{FF2B5EF4-FFF2-40B4-BE49-F238E27FC236}">
+                <a16:creationId xmlns:a16="http://schemas.microsoft.com/office/drawing/2014/main" id="{E8615F64-662C-4D6C-8B0C-2B494C46E859}"/>
+              </a:ext>
+            </a:extLst>
+          </p:cNvPr>
+          <p:cNvSpPr txBox="1"/>
+          <p:nvPr/>
+        </p:nvSpPr>
+        <p:spPr>
+          <a:xfrm>
+            <a:off x="7504507" y="524467"/>
+            <a:ext cx="213520" cy="553998"/>
+          </a:xfrm>
+          <a:prstGeom prst="rect">
+            <a:avLst/>
+          </a:prstGeom>
+          <a:noFill/>
+        </p:spPr>
+        <p:txBody>
+          <a:bodyPr wrap="none" rtlCol="0">
+            <a:spAutoFit/>
+          </a:bodyPr>
+          <a:lstStyle/>
+          <a:p>
+            <a:r>
+              <a:rPr lang="en-US" altLang="ko-KR" sz="1000" dirty="0"/>
+              <a:t>.</a:t>
+            </a:r>
+          </a:p>
+          <a:p>
+            <a:r>
+              <a:rPr lang="en-US" altLang="ko-KR" sz="1000" dirty="0"/>
+              <a:t>.</a:t>
+            </a:r>
+          </a:p>
+          <a:p>
+            <a:r>
+              <a:rPr lang="en-US" altLang="ko-KR" sz="1000" dirty="0"/>
+              <a:t>.</a:t>
+            </a:r>
+            <a:endParaRPr lang="ko-KR" altLang="en-US" sz="1000" dirty="0"/>
           </a:p>
         </p:txBody>
       </p:sp>

</xml_diff>